<commit_message>
Added logo to slides
</commit_message>
<xml_diff>
--- a/Hack4Vilnius2019.pptx
+++ b/Hack4Vilnius2019.pptx
@@ -19658,54 +19658,13 @@
       </p:grpSpPr>
       <p:sp>
         <p:nvSpPr>
-          <p:cNvPr id="12" name="TextBox 11"/>
-          <p:cNvSpPr txBox="1"/>
-          <p:nvPr/>
-        </p:nvSpPr>
-        <p:spPr>
-          <a:xfrm>
-            <a:off x="2489200" y="3737233"/>
-            <a:ext cx="7213600" cy="695447"/>
-          </a:xfrm>
-          <a:prstGeom prst="rect">
-            <a:avLst/>
-          </a:prstGeom>
-          <a:noFill/>
-        </p:spPr>
-        <p:txBody>
-          <a:bodyPr wrap="square" lIns="0" rtlCol="0">
-            <a:spAutoFit/>
-          </a:bodyPr>
-          <a:lstStyle/>
-          <a:p>
-            <a:pPr algn="ctr">
-              <a:lnSpc>
-                <a:spcPct val="120000"/>
-              </a:lnSpc>
-            </a:pPr>
-            <a:r>
-              <a:rPr lang="lt-LT" sz="3600" spc="600" dirty="0" smtClean="0">
-                <a:latin typeface="Segoe UI" panose="020B0502040204020203" pitchFamily="34" charset="0"/>
-                <a:cs typeface="Segoe UI" panose="020B0502040204020203" pitchFamily="34" charset="0"/>
-              </a:rPr>
-              <a:t>CITYSEEK</a:t>
-            </a:r>
-            <a:endParaRPr lang="fr-FR" sz="3600" spc="600" dirty="0">
-              <a:latin typeface="Segoe UI" panose="020B0502040204020203" pitchFamily="34" charset="0"/>
-              <a:cs typeface="Segoe UI" panose="020B0502040204020203" pitchFamily="34" charset="0"/>
-            </a:endParaRPr>
-          </a:p>
-        </p:txBody>
-      </p:sp>
-      <p:sp>
-        <p:nvSpPr>
           <p:cNvPr id="13" name="TextBox 12"/>
           <p:cNvSpPr txBox="1"/>
           <p:nvPr/>
         </p:nvSpPr>
         <p:spPr>
           <a:xfrm>
-            <a:off x="2489200" y="4298669"/>
+            <a:off x="2489200" y="3689069"/>
             <a:ext cx="7213600" cy="757130"/>
           </a:xfrm>
           <a:prstGeom prst="rect">
@@ -19736,186 +19695,36 @@
           </a:p>
         </p:txBody>
       </p:sp>
-      <p:grpSp>
-        <p:nvGrpSpPr>
-          <p:cNvPr id="4" name="Group 3"/>
-          <p:cNvGrpSpPr/>
+      <p:pic>
+        <p:nvPicPr>
+          <p:cNvPr id="2" name="Picture 1"/>
+          <p:cNvPicPr>
+            <a:picLocks noChangeAspect="1"/>
+          </p:cNvPicPr>
           <p:nvPr/>
-        </p:nvGrpSpPr>
-        <p:grpSpPr>
+        </p:nvPicPr>
+        <p:blipFill>
+          <a:blip r:embed="rId2">
+            <a:extLst>
+              <a:ext uri="{28A0092B-C50C-407E-A947-70E740481C1C}">
+                <a14:useLocalDpi xmlns:a14="http://schemas.microsoft.com/office/drawing/2010/main" val="0"/>
+              </a:ext>
+            </a:extLst>
+          </a:blip>
+          <a:stretch>
+            <a:fillRect/>
+          </a:stretch>
+        </p:blipFill>
+        <p:spPr>
           <a:xfrm>
-            <a:off x="4953002" y="1005004"/>
-            <a:ext cx="2285998" cy="2285996"/>
-            <a:chOff x="4761188" y="954891"/>
-            <a:chExt cx="2669626" cy="2669624"/>
+            <a:off x="2413271" y="2413000"/>
+            <a:ext cx="7365458" cy="971269"/>
           </a:xfrm>
-        </p:grpSpPr>
-        <p:sp>
-          <p:nvSpPr>
-            <p:cNvPr id="3" name="Oval 2"/>
-            <p:cNvSpPr/>
-            <p:nvPr/>
-          </p:nvSpPr>
-          <p:spPr>
-            <a:xfrm>
-              <a:off x="4761188" y="954891"/>
-              <a:ext cx="2669626" cy="2669624"/>
-            </a:xfrm>
-            <a:prstGeom prst="ellipse">
-              <a:avLst/>
-            </a:prstGeom>
-            <a:solidFill>
-              <a:schemeClr val="accent1">
-                <a:alpha val="13000"/>
-              </a:schemeClr>
-            </a:solidFill>
-            <a:ln w="76200">
-              <a:noFill/>
-            </a:ln>
-            <a:effectLst>
-              <a:outerShdw blurRad="889000" sx="109000" sy="109000" algn="ctr" rotWithShape="0">
-                <a:schemeClr val="accent1">
-                  <a:alpha val="14000"/>
-                </a:schemeClr>
-              </a:outerShdw>
-            </a:effectLst>
-          </p:spPr>
-          <p:style>
-            <a:lnRef idx="2">
-              <a:schemeClr val="accent1">
-                <a:shade val="50000"/>
-              </a:schemeClr>
-            </a:lnRef>
-            <a:fillRef idx="1">
-              <a:schemeClr val="accent1"/>
-            </a:fillRef>
-            <a:effectRef idx="0">
-              <a:schemeClr val="accent1"/>
-            </a:effectRef>
-            <a:fontRef idx="minor">
-              <a:schemeClr val="lt1"/>
-            </a:fontRef>
-          </p:style>
-          <p:txBody>
-            <a:bodyPr rtlCol="0" anchor="ctr"/>
-            <a:lstStyle/>
-            <a:p>
-              <a:pPr algn="ctr"/>
-              <a:endParaRPr lang="fr-FR"/>
-            </a:p>
-          </p:txBody>
-        </p:sp>
-        <p:sp>
-          <p:nvSpPr>
-            <p:cNvPr id="8" name="Oval 7"/>
-            <p:cNvSpPr/>
-            <p:nvPr/>
-          </p:nvSpPr>
-          <p:spPr>
-            <a:xfrm>
-              <a:off x="5328746" y="1522450"/>
-              <a:ext cx="1534508" cy="1534506"/>
-            </a:xfrm>
-            <a:prstGeom prst="ellipse">
-              <a:avLst/>
-            </a:prstGeom>
-            <a:solidFill>
-              <a:schemeClr val="accent1">
-                <a:alpha val="48000"/>
-              </a:schemeClr>
-            </a:solidFill>
-            <a:ln w="76200">
-              <a:noFill/>
-            </a:ln>
-            <a:effectLst>
-              <a:outerShdw blurRad="889000" sx="109000" sy="109000" algn="ctr" rotWithShape="0">
-                <a:schemeClr val="accent1">
-                  <a:alpha val="14000"/>
-                </a:schemeClr>
-              </a:outerShdw>
-            </a:effectLst>
-          </p:spPr>
-          <p:style>
-            <a:lnRef idx="2">
-              <a:schemeClr val="accent1">
-                <a:shade val="50000"/>
-              </a:schemeClr>
-            </a:lnRef>
-            <a:fillRef idx="1">
-              <a:schemeClr val="accent1"/>
-            </a:fillRef>
-            <a:effectRef idx="0">
-              <a:schemeClr val="accent1"/>
-            </a:effectRef>
-            <a:fontRef idx="minor">
-              <a:schemeClr val="lt1"/>
-            </a:fontRef>
-          </p:style>
-          <p:txBody>
-            <a:bodyPr rtlCol="0" anchor="ctr"/>
-            <a:lstStyle/>
-            <a:p>
-              <a:pPr algn="ctr"/>
-              <a:endParaRPr lang="fr-FR"/>
-            </a:p>
-          </p:txBody>
-        </p:sp>
-        <p:sp>
-          <p:nvSpPr>
-            <p:cNvPr id="9" name="Oval 8"/>
-            <p:cNvSpPr/>
-            <p:nvPr/>
-          </p:nvSpPr>
-          <p:spPr>
-            <a:xfrm>
-              <a:off x="5738650" y="1932353"/>
-              <a:ext cx="714700" cy="714700"/>
-            </a:xfrm>
-            <a:prstGeom prst="ellipse">
-              <a:avLst/>
-            </a:prstGeom>
-            <a:solidFill>
-              <a:schemeClr val="accent1">
-                <a:alpha val="48000"/>
-              </a:schemeClr>
-            </a:solidFill>
-            <a:ln w="76200">
-              <a:noFill/>
-            </a:ln>
-            <a:effectLst>
-              <a:outerShdw blurRad="889000" sx="109000" sy="109000" algn="ctr" rotWithShape="0">
-                <a:schemeClr val="accent1">
-                  <a:alpha val="14000"/>
-                </a:schemeClr>
-              </a:outerShdw>
-            </a:effectLst>
-          </p:spPr>
-          <p:style>
-            <a:lnRef idx="2">
-              <a:schemeClr val="accent1">
-                <a:shade val="50000"/>
-              </a:schemeClr>
-            </a:lnRef>
-            <a:fillRef idx="1">
-              <a:schemeClr val="accent1"/>
-            </a:fillRef>
-            <a:effectRef idx="0">
-              <a:schemeClr val="accent1"/>
-            </a:effectRef>
-            <a:fontRef idx="minor">
-              <a:schemeClr val="lt1"/>
-            </a:fontRef>
-          </p:style>
-          <p:txBody>
-            <a:bodyPr rtlCol="0" anchor="ctr"/>
-            <a:lstStyle/>
-            <a:p>
-              <a:pPr algn="ctr"/>
-              <a:endParaRPr lang="fr-FR"/>
-            </a:p>
-          </p:txBody>
-        </p:sp>
-      </p:grpSp>
+          <a:prstGeom prst="rect">
+            <a:avLst/>
+          </a:prstGeom>
+        </p:spPr>
+      </p:pic>
     </p:spTree>
     <p:extLst>
       <p:ext uri="{BB962C8B-B14F-4D97-AF65-F5344CB8AC3E}">
@@ -32596,11 +32405,11 @@
   <p:clrMapOvr>
     <a:masterClrMapping/>
   </p:clrMapOvr>
-  <mc:AlternateContent xmlns:mc="http://schemas.openxmlformats.org/markup-compatibility/2006">
-    <mc:Choice xmlns:p14="http://schemas.microsoft.com/office/powerpoint/2010/main" Requires="p14">
+  <mc:AlternateContent xmlns:mc="http://schemas.openxmlformats.org/markup-compatibility/2006" xmlns:p14="http://schemas.microsoft.com/office/powerpoint/2010/main">
+    <mc:Choice Requires="p14">
       <p:transition spd="slow" p14:dur="2000"/>
     </mc:Choice>
-    <mc:Fallback>
+    <mc:Fallback xmlns="">
       <p:transition spd="slow"/>
     </mc:Fallback>
   </mc:AlternateContent>
@@ -35041,14 +34850,7 @@
                 <a:latin typeface="Segoe UI Light" panose="020B0502040204020203" pitchFamily="34" charset="0"/>
                 <a:cs typeface="Segoe UI Light" panose="020B0502040204020203" pitchFamily="34" charset="0"/>
               </a:rPr>
-              <a:t>Žaidimai komandos</a:t>
-            </a:r>
-            <a:r>
-              <a:rPr lang="lt-LT" sz="2000" dirty="0" smtClean="0">
-                <a:latin typeface="Segoe UI Light" panose="020B0502040204020203" pitchFamily="34" charset="0"/>
-                <a:cs typeface="Segoe UI Light" panose="020B0502040204020203" pitchFamily="34" charset="0"/>
-              </a:rPr>
-              <a:t> formavimo renginiams</a:t>
+              <a:t>Žaidimai komandos formavimo renginiams</a:t>
             </a:r>
             <a:endParaRPr lang="fr-FR" sz="2000" baseline="30000" dirty="0">
               <a:latin typeface="Segoe UI Light" panose="020B0502040204020203" pitchFamily="34" charset="0"/>
@@ -40600,21 +40402,6 @@
 </file>
 
 <file path=customXml/item1.xml><?xml version="1.0" encoding="utf-8"?>
-<?mso-contentType ?>
-<FormTemplates xmlns="http://schemas.microsoft.com/sharepoint/v3/contenttype/forms">
-  <Display>DocumentLibraryForm</Display>
-  <Edit>DocumentLibraryForm</Edit>
-  <New>DocumentLibraryForm</New>
-</FormTemplates>
-</file>
-
-<file path=customXml/item2.xml><?xml version="1.0" encoding="utf-8"?>
-<p:properties xmlns:p="http://schemas.microsoft.com/office/2006/metadata/properties" xmlns:xsi="http://www.w3.org/2001/XMLSchema-instance" xmlns:pc="http://schemas.microsoft.com/office/infopath/2007/PartnerControls">
-  <documentManagement/>
-</p:properties>
-</file>
-
-<file path=customXml/item3.xml><?xml version="1.0" encoding="utf-8"?>
 <ct:contentTypeSchema xmlns:ct="http://schemas.microsoft.com/office/2006/metadata/contentType" xmlns:ma="http://schemas.microsoft.com/office/2006/metadata/properties/metaAttributes" ct:_="" ma:_="" ma:contentTypeName="Document" ma:contentTypeID="0x01010005FA520563873D4EB8CBD5344A351BEB" ma:contentTypeVersion="0" ma:contentTypeDescription="Crée un document." ma:contentTypeScope="" ma:versionID="005ce72954985de94fc750614f2007cc">
   <xsd:schema xmlns:xsd="http://www.w3.org/2001/XMLSchema" xmlns:xs="http://www.w3.org/2001/XMLSchema" xmlns:p="http://schemas.microsoft.com/office/2006/metadata/properties" targetNamespace="http://schemas.microsoft.com/office/2006/metadata/properties" ma:root="true" ma:fieldsID="36883d0f3030e52908f9a4448a35c02a">
     <xsd:element name="properties">
@@ -40728,10 +40515,33 @@
 </ct:contentTypeSchema>
 </file>
 
+<file path=customXml/item2.xml><?xml version="1.0" encoding="utf-8"?>
+<p:properties xmlns:p="http://schemas.microsoft.com/office/2006/metadata/properties" xmlns:xsi="http://www.w3.org/2001/XMLSchema-instance" xmlns:pc="http://schemas.microsoft.com/office/infopath/2007/PartnerControls">
+  <documentManagement/>
+</p:properties>
+</file>
+
+<file path=customXml/item3.xml><?xml version="1.0" encoding="utf-8"?>
+<?mso-contentType ?>
+<FormTemplates xmlns="http://schemas.microsoft.com/sharepoint/v3/contenttype/forms">
+  <Display>DocumentLibraryForm</Display>
+  <Edit>DocumentLibraryForm</Edit>
+  <New>DocumentLibraryForm</New>
+</FormTemplates>
+</file>
+
 <file path=customXml/itemProps1.xml><?xml version="1.0" encoding="utf-8"?>
-<ds:datastoreItem xmlns:ds="http://schemas.openxmlformats.org/officeDocument/2006/customXml" ds:itemID="{95457E87-E546-449E-A4D1-371201992E58}">
+<ds:datastoreItem xmlns:ds="http://schemas.openxmlformats.org/officeDocument/2006/customXml" ds:itemID="{FF14EDAB-351E-4851-B148-260C81C296AA}">
   <ds:schemaRefs>
-    <ds:schemaRef ds:uri="http://schemas.microsoft.com/sharepoint/v3/contenttype/forms"/>
+    <ds:schemaRef ds:uri="http://schemas.microsoft.com/office/2006/metadata/contentType"/>
+    <ds:schemaRef ds:uri="http://schemas.microsoft.com/office/2006/metadata/properties/metaAttributes"/>
+    <ds:schemaRef ds:uri="http://www.w3.org/2001/XMLSchema"/>
+    <ds:schemaRef ds:uri="http://schemas.microsoft.com/office/2006/metadata/properties"/>
+    <ds:schemaRef ds:uri="http://schemas.openxmlformats.org/package/2006/metadata/core-properties"/>
+    <ds:schemaRef ds:uri="http://purl.org/dc/elements/1.1/"/>
+    <ds:schemaRef ds:uri="http://purl.org/dc/terms/"/>
+    <ds:schemaRef ds:uri="http://schemas.microsoft.com/internal/obd"/>
+    <ds:schemaRef ds:uri="http://schemas.microsoft.com/office/infopath/2007/PartnerControls"/>
   </ds:schemaRefs>
 </ds:datastoreItem>
 </file>
@@ -40752,17 +40562,9 @@
 </file>
 
 <file path=customXml/itemProps3.xml><?xml version="1.0" encoding="utf-8"?>
-<ds:datastoreItem xmlns:ds="http://schemas.openxmlformats.org/officeDocument/2006/customXml" ds:itemID="{FF14EDAB-351E-4851-B148-260C81C296AA}">
+<ds:datastoreItem xmlns:ds="http://schemas.openxmlformats.org/officeDocument/2006/customXml" ds:itemID="{95457E87-E546-449E-A4D1-371201992E58}">
   <ds:schemaRefs>
-    <ds:schemaRef ds:uri="http://schemas.microsoft.com/office/2006/metadata/contentType"/>
-    <ds:schemaRef ds:uri="http://schemas.microsoft.com/office/2006/metadata/properties/metaAttributes"/>
-    <ds:schemaRef ds:uri="http://www.w3.org/2001/XMLSchema"/>
-    <ds:schemaRef ds:uri="http://schemas.microsoft.com/office/2006/metadata/properties"/>
-    <ds:schemaRef ds:uri="http://schemas.openxmlformats.org/package/2006/metadata/core-properties"/>
-    <ds:schemaRef ds:uri="http://purl.org/dc/elements/1.1/"/>
-    <ds:schemaRef ds:uri="http://purl.org/dc/terms/"/>
-    <ds:schemaRef ds:uri="http://schemas.microsoft.com/internal/obd"/>
-    <ds:schemaRef ds:uri="http://schemas.microsoft.com/office/infopath/2007/PartnerControls"/>
+    <ds:schemaRef ds:uri="http://schemas.microsoft.com/sharepoint/v3/contenttype/forms"/>
   </ds:schemaRefs>
 </ds:datastoreItem>
 </file>
</xml_diff>